<commit_message>
typo correction in Session 4 slides
</commit_message>
<xml_diff>
--- a/Session4/MLW_KUHES_RandStatsWorkshops_Session4.pptx
+++ b/Session4/MLW_KUHES_RandStatsWorkshops_Session4.pptx
@@ -384,7 +384,7 @@
           <a:p>
             <a:fld id="{C2113EE3-8373-4C14-933F-C1E589D5B246}" type="datetime1">
               <a:rPr lang="en-GB" smtClean="0"/>
-              <a:t>22/11/2023</a:t>
+              <a:t>27/11/2023</a:t>
             </a:fld>
             <a:endParaRPr lang="en-GB" dirty="0"/>
           </a:p>
@@ -2626,7 +2626,7 @@
           </a:ln>
           <a:extLst>
             <a:ext uri="{91240B29-F687-4f45-9708-019B960494DF}">
-              <a14:hiddenLine xmlns:a14="http://schemas.microsoft.com/office/drawing/2010/main" xmlns="" w="0">
+              <a14:hiddenLine xmlns="" xmlns:a14="http://schemas.microsoft.com/office/drawing/2010/main" w="0">
                 <a:solidFill>
                   <a:srgbClr val="000000"/>
                 </a:solidFill>
@@ -20421,8 +20421,8 @@
           </a:p>
         </p:txBody>
       </p:sp>
-      <mc:AlternateContent xmlns:mc="http://schemas.openxmlformats.org/markup-compatibility/2006" xmlns:a14="http://schemas.microsoft.com/office/drawing/2010/main">
-        <mc:Choice Requires="a14">
+      <mc:AlternateContent xmlns:mc="http://schemas.openxmlformats.org/markup-compatibility/2006">
+        <mc:Choice xmlns:a14="http://schemas.microsoft.com/office/drawing/2010/main" Requires="a14">
           <p:sp>
             <p:nvSpPr>
               <p:cNvPr id="3" name="Content Placeholder 2">
@@ -20446,6 +20446,7 @@
               <a:p>
                 <a:pPr lvl="0"/>
                 <a:r>
+                  <a:rPr lang="en-GB" dirty="0"/>
                   <a:t>Hypotheses:</a:t>
                 </a:r>
               </a:p>
@@ -20456,14 +20457,14 @@
                     <m:sSub>
                       <m:sSubPr>
                         <m:ctrlPr>
-                          <a:rPr i="1">
+                          <a:rPr lang="ar-AE" i="1">
                             <a:latin typeface="Cambria Math" panose="02040503050406030204" pitchFamily="18" charset="0"/>
                           </a:rPr>
                         </m:ctrlPr>
                       </m:sSubPr>
                       <m:e>
                         <m:r>
-                          <a:rPr>
+                          <a:rPr lang="ar-AE">
                             <a:latin typeface="Cambria Math" panose="02040503050406030204" pitchFamily="18" charset="0"/>
                           </a:rPr>
                           <m:t>𝐻</m:t>
@@ -20471,7 +20472,7 @@
                       </m:e>
                       <m:sub>
                         <m:r>
-                          <a:rPr>
+                          <a:rPr lang="ar-AE">
                             <a:latin typeface="Cambria Math" panose="02040503050406030204" pitchFamily="18" charset="0"/>
                           </a:rPr>
                           <m:t>0</m:t>
@@ -20479,7 +20480,7 @@
                       </m:sub>
                     </m:sSub>
                     <m:r>
-                      <a:rPr>
+                      <a:rPr lang="ar-AE">
                         <a:latin typeface="Cambria Math" panose="02040503050406030204" pitchFamily="18" charset="0"/>
                       </a:rPr>
                       <m:t>:</m:t>
@@ -20488,131 +20489,131 @@
                       <m:rPr>
                         <m:nor/>
                       </m:rPr>
-                      <a:rPr/>
+                      <a:rPr lang="ar-AE"/>
                       <m:t> </m:t>
                     </m:r>
                     <m:r>
                       <m:rPr>
                         <m:nor/>
                       </m:rPr>
-                      <a:rPr/>
+                      <a:rPr lang="en-GB"/>
                       <m:t>Groups</m:t>
                     </m:r>
                     <m:r>
                       <m:rPr>
                         <m:nor/>
                       </m:rPr>
-                      <a:rPr/>
+                      <a:rPr lang="en-GB"/>
                       <m:t> 1 </m:t>
                     </m:r>
                     <m:r>
                       <m:rPr>
                         <m:nor/>
                       </m:rPr>
-                      <a:rPr/>
+                      <a:rPr lang="en-GB"/>
                       <m:t>and</m:t>
                     </m:r>
                     <m:r>
                       <m:rPr>
                         <m:nor/>
                       </m:rPr>
-                      <a:rPr/>
+                      <a:rPr lang="en-GB"/>
                       <m:t> 2 </m:t>
                     </m:r>
                     <m:r>
                       <m:rPr>
                         <m:nor/>
                       </m:rPr>
-                      <a:rPr/>
+                      <a:rPr lang="en-GB"/>
                       <m:t>have</m:t>
                     </m:r>
                     <m:r>
                       <m:rPr>
                         <m:nor/>
                       </m:rPr>
-                      <a:rPr/>
+                      <a:rPr lang="en-GB"/>
                       <m:t> </m:t>
                     </m:r>
                     <m:r>
                       <m:rPr>
                         <m:nor/>
                       </m:rPr>
-                      <a:rPr/>
+                      <a:rPr lang="en-GB"/>
                       <m:t>the</m:t>
                     </m:r>
                     <m:r>
                       <m:rPr>
                         <m:nor/>
                       </m:rPr>
-                      <a:rPr/>
+                      <a:rPr lang="en-GB"/>
                       <m:t> </m:t>
                     </m:r>
                     <m:r>
                       <m:rPr>
                         <m:nor/>
                       </m:rPr>
-                      <a:rPr/>
+                      <a:rPr lang="en-GB"/>
                       <m:t>same</m:t>
                     </m:r>
                     <m:r>
                       <m:rPr>
                         <m:nor/>
                       </m:rPr>
-                      <a:rPr/>
+                      <a:rPr lang="en-GB"/>
                       <m:t> </m:t>
                     </m:r>
                     <m:r>
                       <m:rPr>
                         <m:nor/>
                       </m:rPr>
-                      <a:rPr/>
+                      <a:rPr lang="en-GB"/>
                       <m:t>distribution</m:t>
                     </m:r>
                     <m:r>
                       <m:rPr>
                         <m:nor/>
                       </m:rPr>
-                      <a:rPr/>
+                      <a:rPr lang="en-GB"/>
                       <m:t> </m:t>
                     </m:r>
                     <m:r>
                       <m:rPr>
                         <m:nor/>
                       </m:rPr>
-                      <a:rPr/>
+                      <a:rPr lang="en-GB"/>
                       <m:t>for</m:t>
                     </m:r>
                     <m:r>
                       <m:rPr>
                         <m:nor/>
                       </m:rPr>
-                      <a:rPr/>
+                      <a:rPr lang="en-GB"/>
                       <m:t> </m:t>
                     </m:r>
                     <m:r>
                       <m:rPr>
                         <m:nor/>
                       </m:rPr>
-                      <a:rPr/>
+                      <a:rPr lang="en-GB"/>
                       <m:t>variable</m:t>
                     </m:r>
                     <m:r>
                       <m:rPr>
                         <m:nor/>
                       </m:rPr>
-                      <a:rPr/>
+                      <a:rPr lang="en-GB"/>
                       <m:t> </m:t>
                     </m:r>
                     <m:r>
                       <m:rPr>
                         <m:nor/>
                       </m:rPr>
-                      <a:rPr/>
+                      <a:rPr lang="en-GB"/>
                       <m:t>X</m:t>
                     </m:r>
                   </m:oMath>
                 </a14:m>
-                <a:endParaRPr/>
+                <a:endParaRPr lang="en-GB" dirty="0"/>
               </a:p>
               <a:p>
                 <a:pPr lvl="1"/>
@@ -20621,14 +20622,14 @@
                     <m:sSub>
                       <m:sSubPr>
                         <m:ctrlPr>
-                          <a:rPr i="1">
+                          <a:rPr lang="ar-AE" i="1">
                             <a:latin typeface="Cambria Math" panose="02040503050406030204" pitchFamily="18" charset="0"/>
                           </a:rPr>
                         </m:ctrlPr>
                       </m:sSubPr>
                       <m:e>
                         <m:r>
-                          <a:rPr>
+                          <a:rPr lang="ar-AE">
                             <a:latin typeface="Cambria Math" panose="02040503050406030204" pitchFamily="18" charset="0"/>
                           </a:rPr>
                           <m:t>𝐻</m:t>
@@ -20636,15 +20637,15 @@
                       </m:e>
                       <m:sub>
                         <m:r>
-                          <a:rPr>
+                          <a:rPr lang="ar-AE" b="0" i="0" smtClean="0">
                             <a:latin typeface="Cambria Math" panose="02040503050406030204" pitchFamily="18" charset="0"/>
                           </a:rPr>
-                          <m:t>0</m:t>
+                          <m:t>1</m:t>
                         </m:r>
                       </m:sub>
                     </m:sSub>
                     <m:r>
-                      <a:rPr>
+                      <a:rPr lang="ar-AE">
                         <a:latin typeface="Cambria Math" panose="02040503050406030204" pitchFamily="18" charset="0"/>
                       </a:rPr>
                       <m:t>:</m:t>
@@ -20653,121 +20654,122 @@
                       <m:rPr>
                         <m:nor/>
                       </m:rPr>
-                      <a:rPr/>
+                      <a:rPr lang="ar-AE"/>
                       <m:t> </m:t>
                     </m:r>
                     <m:r>
                       <m:rPr>
                         <m:nor/>
                       </m:rPr>
-                      <a:rPr/>
+                      <a:rPr lang="en-GB"/>
                       <m:t>Groups</m:t>
                     </m:r>
                     <m:r>
                       <m:rPr>
                         <m:nor/>
                       </m:rPr>
-                      <a:rPr/>
+                      <a:rPr lang="en-GB"/>
                       <m:t> 1 </m:t>
                     </m:r>
                     <m:r>
                       <m:rPr>
                         <m:nor/>
                       </m:rPr>
-                      <a:rPr/>
+                      <a:rPr lang="en-GB"/>
                       <m:t>and</m:t>
                     </m:r>
                     <m:r>
                       <m:rPr>
                         <m:nor/>
                       </m:rPr>
-                      <a:rPr/>
+                      <a:rPr lang="en-GB"/>
                       <m:t> 2 </m:t>
                     </m:r>
                     <m:r>
                       <m:rPr>
                         <m:nor/>
                       </m:rPr>
-                      <a:rPr/>
+                      <a:rPr lang="en-GB"/>
                       <m:t>have</m:t>
                     </m:r>
                     <m:r>
                       <m:rPr>
                         <m:nor/>
                       </m:rPr>
-                      <a:rPr/>
+                      <a:rPr lang="en-GB"/>
                       <m:t> </m:t>
                     </m:r>
                     <m:r>
                       <m:rPr>
                         <m:nor/>
                       </m:rPr>
-                      <a:rPr/>
+                      <a:rPr lang="en-GB"/>
                       <m:t>different</m:t>
                     </m:r>
                     <m:r>
                       <m:rPr>
                         <m:nor/>
                       </m:rPr>
-                      <a:rPr/>
+                      <a:rPr lang="en-GB"/>
                       <m:t> </m:t>
                     </m:r>
                     <m:r>
                       <m:rPr>
                         <m:nor/>
                       </m:rPr>
-                      <a:rPr/>
+                      <a:rPr lang="en-GB"/>
                       <m:t>distributions</m:t>
                     </m:r>
                     <m:r>
                       <m:rPr>
                         <m:nor/>
                       </m:rPr>
-                      <a:rPr/>
+                      <a:rPr lang="en-GB"/>
                       <m:t> </m:t>
                     </m:r>
                     <m:r>
                       <m:rPr>
                         <m:nor/>
                       </m:rPr>
-                      <a:rPr/>
+                      <a:rPr lang="en-GB"/>
                       <m:t>for</m:t>
                     </m:r>
                     <m:r>
                       <m:rPr>
                         <m:nor/>
                       </m:rPr>
-                      <a:rPr/>
+                      <a:rPr lang="en-GB"/>
                       <m:t> </m:t>
                     </m:r>
                     <m:r>
                       <m:rPr>
                         <m:nor/>
                       </m:rPr>
-                      <a:rPr/>
+                      <a:rPr lang="en-GB"/>
                       <m:t>variable</m:t>
                     </m:r>
                     <m:r>
                       <m:rPr>
                         <m:nor/>
                       </m:rPr>
-                      <a:rPr/>
+                      <a:rPr lang="en-GB"/>
                       <m:t> </m:t>
                     </m:r>
                     <m:r>
                       <m:rPr>
                         <m:nor/>
                       </m:rPr>
-                      <a:rPr/>
+                      <a:rPr lang="en-GB"/>
                       <m:t>X</m:t>
                     </m:r>
                   </m:oMath>
                 </a14:m>
-                <a:endParaRPr/>
+                <a:endParaRPr lang="en-GB" dirty="0"/>
               </a:p>
               <a:p>
                 <a:pPr lvl="0"/>
                 <a:r>
+                  <a:rPr lang="en-GB" dirty="0"/>
                   <a:t>Test statistic</a:t>
                 </a:r>
               </a:p>
@@ -20776,6 +20778,7 @@
                   <a:buNone/>
                 </a:pPr>
                 <a:r>
+                  <a:rPr lang="en-GB" dirty="0"/>
                   <a:t>This one is a bit technical to derive. The test starts by ranking all observations across both groups together. It then compares the sums of ranks in both groups (accounting for potentially different sample sizes in the 2 groups). Under the null hypothesis of equal distributions, the ranks in each group should on average be similar – i.e. the sums of ranks in the 2 groups should be similar.</a:t>
                 </a:r>
               </a:p>
@@ -20784,13 +20787,15 @@
                   <a:buNone/>
                 </a:pPr>
                 <a:r>
+                  <a:rPr lang="en-GB" dirty="0"/>
                   <a:t>The p-value needs to be derived using a computer.</a:t>
                 </a:r>
+                <a:endParaRPr dirty="0"/>
               </a:p>
             </p:txBody>
           </p:sp>
         </mc:Choice>
-        <mc:Fallback xmlns="">
+        <mc:Fallback>
           <p:sp>
             <p:nvSpPr>
               <p:cNvPr id="3" name="Content Placeholder 2">
@@ -20811,7 +20816,7 @@
               <a:blipFill>
                 <a:blip r:embed="rId2"/>
                 <a:stretch>
-                  <a:fillRect l="-696" t="-1567"/>
+                  <a:fillRect l="-724" t="-1626"/>
                 </a:stretch>
               </a:blipFill>
             </p:spPr>

</xml_diff>